<commit_message>
Better Presentation and More Characters
Use more characters from the show and include in the presentation
</commit_message>
<xml_diff>
--- a/Project Presentation-The Aftermath-Ahmed-Ashraf.pptx
+++ b/Project Presentation-The Aftermath-Ahmed-Ashraf.pptx
@@ -107,6 +107,11 @@
       </a:defRPr>
     </a:lvl9pPr>
   </p:defaultTextStyle>
+  <p:extLst>
+    <p:ext uri="{EFAFB233-063F-42B5-8137-9DF3F51BA10A}">
+      <p15:sldGuideLst xmlns:p15="http://schemas.microsoft.com/office/powerpoint/2012/main"/>
+    </p:ext>
+  </p:extLst>
 </p:presentation>
 </file>
 
@@ -302,7 +307,7 @@
             <a:fld id="{B61BEF0D-F0BB-DE4B-95CE-6DB70DBA9567}" type="datetimeFigureOut">
               <a:rPr lang="en-US" dirty="0"/>
               <a:pPr/>
-              <a:t>5/9/2017</a:t>
+              <a:t>5/10/2017</a:t>
             </a:fld>
             <a:endParaRPr lang="en-US" dirty="0"/>
           </a:p>
@@ -735,7 +740,7 @@
             <a:fld id="{B61BEF0D-F0BB-DE4B-95CE-6DB70DBA9567}" type="datetimeFigureOut">
               <a:rPr lang="en-US" dirty="0"/>
               <a:pPr/>
-              <a:t>5/9/2017</a:t>
+              <a:t>5/10/2017</a:t>
             </a:fld>
             <a:endParaRPr lang="en-US" dirty="0"/>
           </a:p>
@@ -982,7 +987,7 @@
             <a:fld id="{B61BEF0D-F0BB-DE4B-95CE-6DB70DBA9567}" type="datetimeFigureOut">
               <a:rPr lang="en-US" dirty="0"/>
               <a:pPr/>
-              <a:t>5/9/2017</a:t>
+              <a:t>5/10/2017</a:t>
             </a:fld>
             <a:endParaRPr lang="en-US" dirty="0"/>
           </a:p>
@@ -1287,7 +1292,7 @@
             <a:fld id="{B61BEF0D-F0BB-DE4B-95CE-6DB70DBA9567}" type="datetimeFigureOut">
               <a:rPr lang="en-US" dirty="0"/>
               <a:pPr/>
-              <a:t>5/9/2017</a:t>
+              <a:t>5/10/2017</a:t>
             </a:fld>
             <a:endParaRPr lang="en-US" dirty="0"/>
           </a:p>
@@ -1602,7 +1607,7 @@
             <a:fld id="{B61BEF0D-F0BB-DE4B-95CE-6DB70DBA9567}" type="datetimeFigureOut">
               <a:rPr lang="en-US" dirty="0"/>
               <a:pPr/>
-              <a:t>5/9/2017</a:t>
+              <a:t>5/10/2017</a:t>
             </a:fld>
             <a:endParaRPr lang="en-US" dirty="0"/>
           </a:p>
@@ -1901,7 +1906,7 @@
             <a:fld id="{B61BEF0D-F0BB-DE4B-95CE-6DB70DBA9567}" type="datetimeFigureOut">
               <a:rPr lang="en-US" dirty="0"/>
               <a:pPr/>
-              <a:t>5/9/2017</a:t>
+              <a:t>5/10/2017</a:t>
             </a:fld>
             <a:endParaRPr lang="en-US" dirty="0"/>
           </a:p>
@@ -2265,7 +2270,7 @@
             <a:fld id="{B61BEF0D-F0BB-DE4B-95CE-6DB70DBA9567}" type="datetimeFigureOut">
               <a:rPr lang="en-US" dirty="0"/>
               <a:pPr/>
-              <a:t>5/9/2017</a:t>
+              <a:t>5/10/2017</a:t>
             </a:fld>
             <a:endParaRPr lang="en-US" dirty="0"/>
           </a:p>
@@ -2436,7 +2441,7 @@
             <a:fld id="{B61BEF0D-F0BB-DE4B-95CE-6DB70DBA9567}" type="datetimeFigureOut">
               <a:rPr lang="en-US" dirty="0"/>
               <a:pPr/>
-              <a:t>5/9/2017</a:t>
+              <a:t>5/10/2017</a:t>
             </a:fld>
             <a:endParaRPr lang="en-US" dirty="0"/>
           </a:p>
@@ -2613,7 +2618,7 @@
             <a:fld id="{B61BEF0D-F0BB-DE4B-95CE-6DB70DBA9567}" type="datetimeFigureOut">
               <a:rPr lang="en-US" dirty="0"/>
               <a:pPr/>
-              <a:t>5/9/2017</a:t>
+              <a:t>5/10/2017</a:t>
             </a:fld>
             <a:endParaRPr lang="en-US" dirty="0"/>
           </a:p>
@@ -2780,7 +2785,7 @@
             <a:fld id="{B61BEF0D-F0BB-DE4B-95CE-6DB70DBA9567}" type="datetimeFigureOut">
               <a:rPr lang="en-US" dirty="0"/>
               <a:pPr/>
-              <a:t>5/9/2017</a:t>
+              <a:t>5/10/2017</a:t>
             </a:fld>
             <a:endParaRPr lang="en-US" dirty="0"/>
           </a:p>
@@ -3027,7 +3032,7 @@
             <a:fld id="{B61BEF0D-F0BB-DE4B-95CE-6DB70DBA9567}" type="datetimeFigureOut">
               <a:rPr lang="en-US" dirty="0"/>
               <a:pPr/>
-              <a:t>5/9/2017</a:t>
+              <a:t>5/10/2017</a:t>
             </a:fld>
             <a:endParaRPr lang="en-US" dirty="0"/>
           </a:p>
@@ -3260,7 +3265,7 @@
             <a:fld id="{B61BEF0D-F0BB-DE4B-95CE-6DB70DBA9567}" type="datetimeFigureOut">
               <a:rPr lang="en-US" dirty="0"/>
               <a:pPr/>
-              <a:t>5/9/2017</a:t>
+              <a:t>5/10/2017</a:t>
             </a:fld>
             <a:endParaRPr lang="en-US" dirty="0"/>
           </a:p>
@@ -3639,7 +3644,7 @@
             <a:fld id="{B61BEF0D-F0BB-DE4B-95CE-6DB70DBA9567}" type="datetimeFigureOut">
               <a:rPr lang="en-US" dirty="0"/>
               <a:pPr/>
-              <a:t>5/9/2017</a:t>
+              <a:t>5/10/2017</a:t>
             </a:fld>
             <a:endParaRPr lang="en-US" dirty="0"/>
           </a:p>
@@ -3754,7 +3759,7 @@
             <a:fld id="{B61BEF0D-F0BB-DE4B-95CE-6DB70DBA9567}" type="datetimeFigureOut">
               <a:rPr lang="en-US" dirty="0"/>
               <a:pPr/>
-              <a:t>5/9/2017</a:t>
+              <a:t>5/10/2017</a:t>
             </a:fld>
             <a:endParaRPr lang="en-US" dirty="0"/>
           </a:p>
@@ -3846,7 +3851,7 @@
             <a:fld id="{B61BEF0D-F0BB-DE4B-95CE-6DB70DBA9567}" type="datetimeFigureOut">
               <a:rPr lang="en-US" dirty="0"/>
               <a:pPr/>
-              <a:t>5/9/2017</a:t>
+              <a:t>5/10/2017</a:t>
             </a:fld>
             <a:endParaRPr lang="en-US" dirty="0"/>
           </a:p>
@@ -4098,7 +4103,7 @@
             <a:fld id="{B61BEF0D-F0BB-DE4B-95CE-6DB70DBA9567}" type="datetimeFigureOut">
               <a:rPr lang="en-US" dirty="0"/>
               <a:pPr/>
-              <a:t>5/9/2017</a:t>
+              <a:t>5/10/2017</a:t>
             </a:fld>
             <a:endParaRPr lang="en-US" dirty="0"/>
           </a:p>
@@ -4378,7 +4383,7 @@
             <a:fld id="{B61BEF0D-F0BB-DE4B-95CE-6DB70DBA9567}" type="datetimeFigureOut">
               <a:rPr lang="en-US" dirty="0"/>
               <a:pPr/>
-              <a:t>5/9/2017</a:t>
+              <a:t>5/10/2017</a:t>
             </a:fld>
             <a:endParaRPr lang="en-US" dirty="0"/>
           </a:p>
@@ -4781,7 +4786,7 @@
             <a:fld id="{B61BEF0D-F0BB-DE4B-95CE-6DB70DBA9567}" type="datetimeFigureOut">
               <a:rPr lang="en-US" dirty="0"/>
               <a:pPr/>
-              <a:t>5/9/2017</a:t>
+              <a:t>5/10/2017</a:t>
             </a:fld>
             <a:endParaRPr lang="en-US" dirty="0"/>
           </a:p>
@@ -5355,7 +5360,6 @@
               <a:rPr lang="en-US" sz="3200" dirty="0"/>
               <a:t>Social Impact of a TV Show</a:t>
             </a:r>
-            <a:endParaRPr lang="en-US" sz="3200" dirty="0"/>
           </a:p>
         </p:txBody>
       </p:sp>
@@ -5399,7 +5403,12 @@
             <p:ph type="title"/>
           </p:nvPr>
         </p:nvSpPr>
-        <p:spPr/>
+        <p:spPr>
+          <a:xfrm>
+            <a:off x="684212" y="4487332"/>
+            <a:ext cx="8534400" cy="1888068"/>
+          </a:xfrm>
+        </p:spPr>
         <p:txBody>
           <a:bodyPr>
             <a:noAutofit/>
@@ -5423,6 +5432,13 @@
             <a:r>
               <a:rPr lang="en-US" sz="2000" dirty="0"/>
               <a:t>children named Sheldon : -0.692</a:t>
+            </a:r>
+            <a:br>
+              <a:rPr lang="en-US" sz="2000" dirty="0"/>
+            </a:br>
+            <a:r>
+              <a:rPr lang="en-US" sz="2000" dirty="0"/>
+              <a:t>children named Leonard : 0.860</a:t>
             </a:r>
             <a:br>
               <a:rPr lang="en-US" sz="2000" dirty="0"/>
@@ -5460,7 +5476,7 @@
         </p:blipFill>
         <p:spPr>
           <a:xfrm>
-            <a:off x="2974108" y="186267"/>
+            <a:off x="2838642" y="101601"/>
             <a:ext cx="7204363" cy="4165600"/>
           </a:xfrm>
           <a:prstGeom prst="rect">
@@ -5508,7 +5524,12 @@
             <p:ph type="title"/>
           </p:nvPr>
         </p:nvSpPr>
-        <p:spPr/>
+        <p:spPr>
+          <a:xfrm>
+            <a:off x="684212" y="4487332"/>
+            <a:ext cx="8534400" cy="1871135"/>
+          </a:xfrm>
+        </p:spPr>
         <p:txBody>
           <a:bodyPr>
             <a:noAutofit/>
@@ -5539,6 +5560,13 @@
             <a:r>
               <a:rPr lang="en-US" sz="2000" dirty="0"/>
               <a:t>children named Ted : -0.662</a:t>
+            </a:r>
+            <a:br>
+              <a:rPr lang="en-US" sz="2000" dirty="0"/>
+            </a:br>
+            <a:r>
+              <a:rPr lang="en-US" sz="2000" dirty="0"/>
+              <a:t>children named Lily : 0.875</a:t>
             </a:r>
             <a:br>
               <a:rPr lang="en-US" sz="2000" dirty="0"/>
@@ -5569,8 +5597,8 @@
         </p:blipFill>
         <p:spPr>
           <a:xfrm>
-            <a:off x="3121891" y="90156"/>
-            <a:ext cx="6483927" cy="4121626"/>
+            <a:off x="2794001" y="90156"/>
+            <a:ext cx="6811818" cy="4121626"/>
           </a:xfrm>
           <a:prstGeom prst="rect">
             <a:avLst/>
@@ -5617,7 +5645,12 @@
             <p:ph type="title"/>
           </p:nvPr>
         </p:nvSpPr>
-        <p:spPr/>
+        <p:spPr>
+          <a:xfrm>
+            <a:off x="684212" y="4487332"/>
+            <a:ext cx="8534400" cy="2269068"/>
+          </a:xfrm>
+        </p:spPr>
         <p:txBody>
           <a:bodyPr>
             <a:noAutofit/>
@@ -5641,6 +5674,20 @@
             <a:r>
               <a:rPr lang="en-US" sz="2000" dirty="0"/>
               <a:t>children named Khaleesi : 0.979</a:t>
+            </a:r>
+            <a:br>
+              <a:rPr lang="en-US" sz="2000" dirty="0"/>
+            </a:br>
+            <a:r>
+              <a:rPr lang="en-US" sz="2000" dirty="0"/>
+              <a:t>children named Jon : -0.727</a:t>
+            </a:r>
+            <a:br>
+              <a:rPr lang="en-US" sz="2000" dirty="0"/>
+            </a:br>
+            <a:r>
+              <a:rPr lang="en-US" sz="2000" dirty="0"/>
+              <a:t>children named Arya : 0.794</a:t>
             </a:r>
             <a:br>
               <a:rPr lang="en-US" sz="2000" dirty="0"/>

</xml_diff>